<commit_message>
Implement a new function to generate a file containing all the first slide of the report for all patients in one batch. The report template file is also updated for this. (Group object changed into image type for the first slide.)
</commit_message>
<xml_diff>
--- a/In/Template/InPreD_MTB_template.pptx
+++ b/In/Template/InPreD_MTB_template.pptx
@@ -6519,146 +6519,131 @@
           </p:style>
         </p:sp>
       </p:grpSp>
-      <p:grpSp>
-        <p:nvGrpSpPr>
-          <p:cNvPr id="65" name="Gruppe 64"/>
-          <p:cNvGrpSpPr/>
+      <p:pic>
+        <p:nvPicPr>
+          <p:cNvPr id="66" name="Bilde 65"/>
+          <p:cNvPicPr>
+            <a:picLocks noChangeAspect="1"/>
+          </p:cNvPicPr>
           <p:nvPr/>
-        </p:nvGrpSpPr>
-        <p:grpSpPr>
+        </p:nvPicPr>
+        <p:blipFill rotWithShape="1">
+          <a:blip r:embed="rId3" cstate="print">
+            <a:extLst>
+              <a:ext uri="{28A0092B-C50C-407E-A947-70E740481C1C}">
+                <a14:useLocalDpi xmlns:a14="http://schemas.microsoft.com/office/drawing/2010/main" val="0"/>
+              </a:ext>
+            </a:extLst>
+          </a:blip>
+          <a:srcRect r="55763"/>
+          <a:stretch>
+            <a:fillRect/>
+          </a:stretch>
+        </p:blipFill>
+        <p:spPr>
           <a:xfrm>
-            <a:off x="178883" y="4141493"/>
-            <a:ext cx="1386611" cy="631548"/>
-            <a:chOff x="178883" y="4141493"/>
-            <a:chExt cx="1386611" cy="631548"/>
+            <a:off x="179070" y="4227830"/>
+            <a:ext cx="576580" cy="542925"/>
           </a:xfrm>
-        </p:grpSpPr>
-        <p:pic>
-          <p:nvPicPr>
-            <p:cNvPr id="66" name="Bilde 65"/>
-            <p:cNvPicPr>
-              <a:picLocks noChangeAspect="1"/>
-            </p:cNvPicPr>
-            <p:nvPr/>
-          </p:nvPicPr>
-          <p:blipFill rotWithShape="1">
-            <a:blip r:embed="rId3" cstate="print">
-              <a:extLst>
-                <a:ext uri="{28A0092B-C50C-407E-A947-70E740481C1C}">
-                  <a14:useLocalDpi xmlns:a14="http://schemas.microsoft.com/office/drawing/2010/main" val="0"/>
-                </a:ext>
-              </a:extLst>
-            </a:blip>
-            <a:srcRect r="55763"/>
-            <a:stretch>
-              <a:fillRect/>
-            </a:stretch>
-          </p:blipFill>
-          <p:spPr>
-            <a:xfrm>
-              <a:off x="178883" y="4229919"/>
-              <a:ext cx="576693" cy="543122"/>
-            </a:xfrm>
-            <a:prstGeom prst="rect">
-              <a:avLst/>
-            </a:prstGeom>
-          </p:spPr>
-        </p:pic>
-        <p:sp>
-          <p:nvSpPr>
-            <p:cNvPr id="67" name="TekstSylinder 66"/>
-            <p:cNvSpPr txBox="1"/>
-            <p:nvPr/>
-          </p:nvSpPr>
-          <p:spPr>
-            <a:xfrm>
-              <a:off x="647284" y="4495960"/>
-              <a:ext cx="918210" cy="275590"/>
-            </a:xfrm>
-            <a:prstGeom prst="rect">
-              <a:avLst/>
-            </a:prstGeom>
-            <a:noFill/>
-          </p:spPr>
-          <p:txBody>
-            <a:bodyPr wrap="none" rtlCol="0">
-              <a:spAutoFit/>
-            </a:bodyPr>
-            <a:lstStyle/>
-            <a:p>
-              <a:pPr algn="ctr"/>
-              <a:r>
-                <a:rPr lang="en-US" sz="600" dirty="0">
-                  <a:solidFill>
-                    <a:srgbClr val="005495"/>
-                  </a:solidFill>
-                  <a:latin typeface="Calibri Light" panose="020F0302020204030204" pitchFamily="34" charset="0"/>
-                  <a:cs typeface="Calibri Light" panose="020F0302020204030204" pitchFamily="34" charset="0"/>
-                </a:rPr>
-                <a:t>Infrastructure for </a:t>
-              </a:r>
-              <a:endParaRPr lang="en-US" sz="600" dirty="0">
+          <a:prstGeom prst="rect">
+            <a:avLst/>
+          </a:prstGeom>
+        </p:spPr>
+      </p:pic>
+      <p:sp>
+        <p:nvSpPr>
+          <p:cNvPr id="67" name="TekstSylinder 66"/>
+          <p:cNvSpPr txBox="1"/>
+          <p:nvPr/>
+        </p:nvSpPr>
+        <p:spPr>
+          <a:xfrm>
+            <a:off x="647065" y="4493895"/>
+            <a:ext cx="918210" cy="275590"/>
+          </a:xfrm>
+          <a:prstGeom prst="rect">
+            <a:avLst/>
+          </a:prstGeom>
+          <a:noFill/>
+        </p:spPr>
+        <p:txBody>
+          <a:bodyPr wrap="none" rtlCol="0">
+            <a:spAutoFit/>
+          </a:bodyPr>
+          <a:lstStyle/>
+          <a:p>
+            <a:pPr algn="ctr"/>
+            <a:r>
+              <a:rPr lang="en-US" sz="600" dirty="0">
                 <a:solidFill>
                   <a:srgbClr val="005495"/>
                 </a:solidFill>
                 <a:latin typeface="Calibri Light" panose="020F0302020204030204" pitchFamily="34" charset="0"/>
                 <a:cs typeface="Calibri Light" panose="020F0302020204030204" pitchFamily="34" charset="0"/>
-              </a:endParaRPr>
-            </a:p>
-            <a:p>
-              <a:pPr algn="ctr"/>
-              <a:r>
-                <a:rPr lang="en-US" sz="600" dirty="0">
-                  <a:solidFill>
-                    <a:srgbClr val="005495"/>
-                  </a:solidFill>
-                  <a:latin typeface="Calibri Light" panose="020F0302020204030204" pitchFamily="34" charset="0"/>
-                  <a:cs typeface="Calibri Light" panose="020F0302020204030204" pitchFamily="34" charset="0"/>
-                </a:rPr>
-                <a:t>Precision Diagnostics</a:t>
-              </a:r>
-              <a:endParaRPr lang="nb-NO" sz="600" dirty="0">
+              </a:rPr>
+              <a:t>Infrastructure for </a:t>
+            </a:r>
+            <a:endParaRPr lang="en-US" sz="600" dirty="0">
+              <a:solidFill>
+                <a:srgbClr val="005495"/>
+              </a:solidFill>
+              <a:latin typeface="Calibri Light" panose="020F0302020204030204" pitchFamily="34" charset="0"/>
+              <a:cs typeface="Calibri Light" panose="020F0302020204030204" pitchFamily="34" charset="0"/>
+            </a:endParaRPr>
+          </a:p>
+          <a:p>
+            <a:pPr algn="ctr"/>
+            <a:r>
+              <a:rPr lang="en-US" sz="600" dirty="0">
                 <a:solidFill>
                   <a:srgbClr val="005495"/>
                 </a:solidFill>
                 <a:latin typeface="Calibri Light" panose="020F0302020204030204" pitchFamily="34" charset="0"/>
                 <a:cs typeface="Calibri Light" panose="020F0302020204030204" pitchFamily="34" charset="0"/>
-              </a:endParaRPr>
-            </a:p>
-          </p:txBody>
-        </p:sp>
-        <p:pic>
-          <p:nvPicPr>
-            <p:cNvPr id="68" name="Bilde 67"/>
-            <p:cNvPicPr>
-              <a:picLocks noChangeAspect="1"/>
-            </p:cNvPicPr>
-            <p:nvPr/>
-          </p:nvPicPr>
-          <p:blipFill rotWithShape="1">
-            <a:blip r:embed="rId3" cstate="print">
-              <a:extLst>
-                <a:ext uri="{28A0092B-C50C-407E-A947-70E740481C1C}">
-                  <a14:useLocalDpi xmlns:a14="http://schemas.microsoft.com/office/drawing/2010/main" val="0"/>
-                </a:ext>
-              </a:extLst>
-            </a:blip>
-            <a:srcRect l="42717" r="-3477"/>
-            <a:stretch>
-              <a:fillRect/>
-            </a:stretch>
-          </p:blipFill>
-          <p:spPr>
-            <a:xfrm>
-              <a:off x="737258" y="4141493"/>
-              <a:ext cx="792088" cy="543122"/>
-            </a:xfrm>
-            <a:prstGeom prst="rect">
-              <a:avLst/>
-            </a:prstGeom>
-          </p:spPr>
-        </p:pic>
-      </p:grpSp>
+              </a:rPr>
+              <a:t>Precision Diagnostics</a:t>
+            </a:r>
+            <a:endParaRPr lang="nb-NO" sz="600" dirty="0">
+              <a:solidFill>
+                <a:srgbClr val="005495"/>
+              </a:solidFill>
+              <a:latin typeface="Calibri Light" panose="020F0302020204030204" pitchFamily="34" charset="0"/>
+              <a:cs typeface="Calibri Light" panose="020F0302020204030204" pitchFamily="34" charset="0"/>
+            </a:endParaRPr>
+          </a:p>
+        </p:txBody>
+      </p:sp>
+      <p:pic>
+        <p:nvPicPr>
+          <p:cNvPr id="68" name="Bilde 67"/>
+          <p:cNvPicPr>
+            <a:picLocks noChangeAspect="1"/>
+          </p:cNvPicPr>
+          <p:nvPr/>
+        </p:nvPicPr>
+        <p:blipFill rotWithShape="1">
+          <a:blip r:embed="rId3" cstate="print">
+            <a:extLst>
+              <a:ext uri="{28A0092B-C50C-407E-A947-70E740481C1C}">
+                <a14:useLocalDpi xmlns:a14="http://schemas.microsoft.com/office/drawing/2010/main" val="0"/>
+              </a:ext>
+            </a:extLst>
+          </a:blip>
+          <a:srcRect l="42717" r="-3477"/>
+          <a:stretch>
+            <a:fillRect/>
+          </a:stretch>
+        </p:blipFill>
+        <p:spPr>
+          <a:xfrm>
+            <a:off x="737235" y="4139565"/>
+            <a:ext cx="791845" cy="542925"/>
+          </a:xfrm>
+          <a:prstGeom prst="rect">
+            <a:avLst/>
+          </a:prstGeom>
+        </p:spPr>
+      </p:pic>
       <p:sp>
         <p:nvSpPr>
           <p:cNvPr id="69" name="TextBox 41"/>

</xml_diff>